<commit_message>
Update Sprint 5 Planung
</commit_message>
<xml_diff>
--- a/SprintReview-5.pptx
+++ b/SprintReview-5.pptx
@@ -263,10 +263,10 @@
                 <c:formatCode>General</c:formatCode>
                 <c:ptCount val="3"/>
                 <c:pt idx="0">
-                  <c:v>57</c:v>
+                  <c:v>77</c:v>
                 </c:pt>
                 <c:pt idx="1">
-                  <c:v>28.5</c:v>
+                  <c:v>38.5</c:v>
                 </c:pt>
                 <c:pt idx="2">
                   <c:v>0</c:v>
@@ -331,10 +331,10 @@
                 <c:formatCode>General</c:formatCode>
                 <c:ptCount val="3"/>
                 <c:pt idx="0">
-                  <c:v>57</c:v>
+                  <c:v>77</c:v>
                 </c:pt>
                 <c:pt idx="1">
-                  <c:v>20</c:v>
+                  <c:v>30</c:v>
                 </c:pt>
                 <c:pt idx="2">
                   <c:v>0</c:v>
@@ -658,7 +658,7 @@
                   <c:v>27</c:v>
                 </c:pt>
                 <c:pt idx="4">
-                  <c:v>57</c:v>
+                  <c:v>77</c:v>
                 </c:pt>
               </c:numCache>
             </c:numRef>
@@ -2059,7 +2059,7 @@
             </a:pPr>
             <a:fld id="{3953DA5E-C6E2-4FA2-8BC8-7FF9A5EB6734}" type="datetimeFigureOut">
               <a:rPr lang="de-DE"/>
-              <a:t>29.05.2024</a:t>
+              <a:t>05.06.2024</a:t>
             </a:fld>
             <a:endParaRPr lang="de-DE"/>
           </a:p>
@@ -2240,7 +2240,7 @@
           <a:p>
             <a:fld id="{88DE360A-102B-474E-BEC0-79AC7566E430}" type="datetimeFigureOut">
               <a:rPr lang="en-US" smtClean="0"/>
-              <a:t>5/29/2024</a:t>
+              <a:t>6/5/2024</a:t>
             </a:fld>
             <a:endParaRPr lang="en-US"/>
           </a:p>
@@ -6554,14 +6554,11 @@
           <a:p>
             <a:pPr algn="ctr"/>
             <a:r>
-              <a:rPr lang="de-DE" altLang="de-AT" sz="3600">
+              <a:rPr lang="de-DE" altLang="de-AT" sz="3600" dirty="0">
                 <a:cs typeface="+mj-lt"/>
               </a:rPr>
               <a:t>Sprint 5 (16.05 - 12.06)</a:t>
             </a:r>
-            <a:endParaRPr lang="de-DE" altLang="de-AT" sz="3600" dirty="0">
-              <a:cs typeface="+mj-lt"/>
-            </a:endParaRPr>
           </a:p>
           <a:p>
             <a:pPr algn="ctr"/>
@@ -6740,7 +6737,7 @@
         <p:spPr>
           <a:xfrm>
             <a:off x="611505" y="1628775"/>
-            <a:ext cx="8223250" cy="2185214"/>
+            <a:ext cx="8223250" cy="2462213"/>
           </a:xfrm>
           <a:prstGeom prst="rect">
             <a:avLst/>
@@ -6909,6 +6906,21 @@
                 <a:latin typeface="Calibri" panose="020F0502020204030204" charset="0"/>
               </a:rPr>
               <a:t> fertig machen</a:t>
+            </a:r>
+          </a:p>
+          <a:p>
+            <a:pPr indent="0">
+              <a:buFont typeface="Arial" panose="020B0604020202020204" pitchFamily="34" charset="0"/>
+              <a:buNone/>
+            </a:pPr>
+            <a:r>
+              <a:rPr lang="de-DE" altLang="en-US" dirty="0">
+                <a:highlight>
+                  <a:srgbClr val="00FF00"/>
+                </a:highlight>
+                <a:latin typeface="Calibri" panose="020F0502020204030204" charset="0"/>
+              </a:rPr>
+              <a:t>Endpräsentation erstellen</a:t>
             </a:r>
             <a:endParaRPr lang="de-DE" altLang="en-US" dirty="0">
               <a:highlight>
@@ -7076,14 +7088,14 @@
           <p:nvPr>
             <p:extLst>
               <p:ext uri="{D42A27DB-BD31-4B8C-83A1-F6EECF244321}">
-                <p14:modId xmlns:p14="http://schemas.microsoft.com/office/powerpoint/2010/main" val="2368483697"/>
+                <p14:modId xmlns:p14="http://schemas.microsoft.com/office/powerpoint/2010/main" val="2611407122"/>
               </p:ext>
             </p:extLst>
           </p:nvPr>
         </p:nvGraphicFramePr>
         <p:xfrm>
           <a:off x="683895" y="2132965"/>
-          <a:ext cx="7696200" cy="2828002"/>
+          <a:ext cx="7696200" cy="3194253"/>
         </p:xfrm>
         <a:graphic>
           <a:graphicData uri="http://schemas.openxmlformats.org/drawingml/2006/table">
@@ -7782,6 +7794,106 @@
                   </a:ext>
                 </a:extLst>
               </a:tr>
+              <a:tr h="366251">
+                <a:tc>
+                  <a:txBody>
+                    <a:bodyPr/>
+                    <a:lstStyle/>
+                    <a:p>
+                      <a:pPr>
+                        <a:buNone/>
+                      </a:pPr>
+                      <a:r>
+                        <a:rPr lang="de-DE" altLang="en-US" dirty="0">
+                          <a:latin typeface="Calibri" panose="020F0502020204030204" charset="0"/>
+                        </a:rPr>
+                        <a:t>26</a:t>
+                      </a:r>
+                    </a:p>
+                  </a:txBody>
+                  <a:tcPr/>
+                </a:tc>
+                <a:tc>
+                  <a:txBody>
+                    <a:bodyPr/>
+                    <a:lstStyle/>
+                    <a:p>
+                      <a:pPr>
+                        <a:buNone/>
+                      </a:pPr>
+                      <a:r>
+                        <a:rPr lang="de-DE" altLang="en-US" dirty="0">
+                          <a:latin typeface="Calibri" panose="020F0502020204030204" charset="0"/>
+                        </a:rPr>
+                        <a:t>Stefan Rautner</a:t>
+                      </a:r>
+                    </a:p>
+                  </a:txBody>
+                  <a:tcPr/>
+                </a:tc>
+                <a:tc>
+                  <a:txBody>
+                    <a:bodyPr/>
+                    <a:lstStyle/>
+                    <a:p>
+                      <a:pPr>
+                        <a:buNone/>
+                      </a:pPr>
+                      <a:r>
+                        <a:rPr lang="de-DE" altLang="en-US" dirty="0">
+                          <a:latin typeface="Calibri" panose="020F0502020204030204" charset="0"/>
+                        </a:rPr>
+                        <a:t>Endpräsentation erstellen</a:t>
+                      </a:r>
+                    </a:p>
+                  </a:txBody>
+                  <a:tcPr/>
+                </a:tc>
+                <a:tc>
+                  <a:txBody>
+                    <a:bodyPr/>
+                    <a:lstStyle/>
+                    <a:p>
+                      <a:pPr>
+                        <a:buNone/>
+                      </a:pPr>
+                      <a:r>
+                        <a:rPr lang="de-DE" altLang="en-US" dirty="0">
+                          <a:latin typeface="Calibri" panose="020F0502020204030204" charset="0"/>
+                        </a:rPr>
+                        <a:t>20</a:t>
+                      </a:r>
+                    </a:p>
+                  </a:txBody>
+                  <a:tcPr/>
+                </a:tc>
+                <a:tc>
+                  <a:txBody>
+                    <a:bodyPr/>
+                    <a:lstStyle/>
+                    <a:p>
+                      <a:pPr>
+                        <a:buNone/>
+                      </a:pPr>
+                      <a:r>
+                        <a:rPr lang="de-DE" altLang="en-US" dirty="0">
+                          <a:highlight>
+                            <a:srgbClr val="00FF00"/>
+                          </a:highlight>
+                          <a:latin typeface="Calibri" panose="020F0502020204030204" charset="0"/>
+                        </a:rPr>
+                        <a:t>Erledigt</a:t>
+                      </a:r>
+                    </a:p>
+                  </a:txBody>
+                  <a:tcPr/>
+                </a:tc>
+                <a:extLst>
+                  <a:ext uri="{0D108BD9-81ED-4DB2-BD59-A6C34878D82A}">
+                    <a16:rowId xmlns:a16="http://schemas.microsoft.com/office/drawing/2014/main" val="339611048"/>
+                  </a:ext>
+                </a:extLst>
+              </a:tr>
             </a:tbl>
           </a:graphicData>
         </a:graphic>
@@ -7864,7 +7976,7 @@
               <a:rPr lang="de-DE" sz="1400" dirty="0">
                 <a:latin typeface="Calibri" panose="020F0502020204030204" charset="0"/>
               </a:rPr>
-              <a:t>Geplante Storypoints:	57</a:t>
+              <a:t>Geplante Storypoints:	77</a:t>
             </a:r>
           </a:p>
           <a:p>
@@ -7872,7 +7984,7 @@
               <a:rPr lang="de-DE" sz="1400" dirty="0">
                 <a:latin typeface="Calibri" panose="020F0502020204030204" charset="0"/>
               </a:rPr>
-              <a:t>Erledigte Storypoints:	57</a:t>
+              <a:t>Erledigte Storypoints:	77</a:t>
             </a:r>
           </a:p>
           <a:p>
@@ -7971,7 +8083,7 @@
           <p:nvPr>
             <p:extLst>
               <p:ext uri="{D42A27DB-BD31-4B8C-83A1-F6EECF244321}">
-                <p14:modId xmlns:p14="http://schemas.microsoft.com/office/powerpoint/2010/main" val="1097384827"/>
+                <p14:modId xmlns:p14="http://schemas.microsoft.com/office/powerpoint/2010/main" val="1989876834"/>
               </p:ext>
             </p:extLst>
           </p:nvPr>
@@ -8064,7 +8176,7 @@
               <a:rPr lang="de-DE" sz="1400" dirty="0">
                 <a:latin typeface="Calibri" panose="020F0502020204030204" charset="0"/>
               </a:rPr>
-              <a:t>Velocity Sprint 1:	57</a:t>
+              <a:t>Velocity Sprint 1:	77</a:t>
             </a:r>
           </a:p>
           <a:p>
@@ -8072,7 +8184,7 @@
               <a:rPr lang="de-DE" sz="1400" dirty="0">
                 <a:latin typeface="Calibri" panose="020F0502020204030204" charset="0"/>
               </a:rPr>
-              <a:t>Velocity Sprint 1-n:	36,2</a:t>
+              <a:t>Velocity Sprint 1-n:	40,2</a:t>
             </a:r>
           </a:p>
         </p:txBody>
@@ -8141,7 +8253,7 @@
           <p:nvPr>
             <p:extLst>
               <p:ext uri="{D42A27DB-BD31-4B8C-83A1-F6EECF244321}">
-                <p14:modId xmlns:p14="http://schemas.microsoft.com/office/powerpoint/2010/main" val="1221325228"/>
+                <p14:modId xmlns:p14="http://schemas.microsoft.com/office/powerpoint/2010/main" val="4144131917"/>
               </p:ext>
             </p:extLst>
           </p:nvPr>
@@ -9200,6 +9312,15 @@
 </file>
 
 <file path=customXml/item1.xml><?xml version="1.0" encoding="utf-8"?>
+<?mso-contentType ?>
+<FormTemplates xmlns="http://schemas.microsoft.com/sharepoint/v3/contenttype/forms">
+  <Display>DocumentLibraryForm</Display>
+  <Edit>DocumentLibraryForm</Edit>
+  <New>DocumentLibraryForm</New>
+</FormTemplates>
+</file>
+
+<file path=customXml/item2.xml><?xml version="1.0" encoding="utf-8"?>
 <ct:contentTypeSchema xmlns:ct="http://schemas.microsoft.com/office/2006/metadata/contentType" xmlns:ma="http://schemas.microsoft.com/office/2006/metadata/properties/metaAttributes" ct:_="" ma:_="" ma:contentTypeName="Dokument" ma:contentTypeID="0x0101001A56A123154F954888BA0DA91FFC860A" ma:contentTypeVersion="6" ma:contentTypeDescription="Ein neues Dokument erstellen." ma:contentTypeScope="" ma:versionID="ff1307b2e09c0e62c228ec6b95c7fa4a">
   <xsd:schema xmlns:xsd="http://www.w3.org/2001/XMLSchema" xmlns:xs="http://www.w3.org/2001/XMLSchema" xmlns:p="http://schemas.microsoft.com/office/2006/metadata/properties" xmlns:ns2="c8b2f909-83aa-43b7-ab4a-271920d90ab4" xmlns:ns3="b63bec69-af29-4270-86aa-339f73c85580" targetNamespace="http://schemas.microsoft.com/office/2006/metadata/properties" ma:root="true" ma:fieldsID="f08ec8f7ce92c05fcd6620fcba48b801" ns2:_="" ns3:_="">
     <xsd:import namespace="c8b2f909-83aa-43b7-ab4a-271920d90ab4"/>
@@ -9376,16 +9497,15 @@
 </ct:contentTypeSchema>
 </file>
 
-<file path=customXml/item2.xml><?xml version="1.0" encoding="utf-8"?>
-<?mso-contentType ?>
-<FormTemplates xmlns="http://schemas.microsoft.com/sharepoint/v3/contenttype/forms">
-  <Display>DocumentLibraryForm</Display>
-  <Edit>DocumentLibraryForm</Edit>
-  <New>DocumentLibraryForm</New>
-</FormTemplates>
+<file path=customXml/itemProps1.xml><?xml version="1.0" encoding="utf-8"?>
+<ds:datastoreItem xmlns:ds="http://schemas.openxmlformats.org/officeDocument/2006/customXml" ds:itemID="{87D72E06-1029-4F4F-A291-72DB24A2B963}">
+  <ds:schemaRefs>
+    <ds:schemaRef ds:uri="http://schemas.microsoft.com/sharepoint/v3/contenttype/forms"/>
+  </ds:schemaRefs>
+</ds:datastoreItem>
 </file>
 
-<file path=customXml/itemProps1.xml><?xml version="1.0" encoding="utf-8"?>
+<file path=customXml/itemProps2.xml><?xml version="1.0" encoding="utf-8"?>
 <ds:datastoreItem xmlns:ds="http://schemas.openxmlformats.org/officeDocument/2006/customXml" ds:itemID="{188C9C42-3661-485F-8165-69FBA9FB301E}">
   <ds:schemaRefs>
     <ds:schemaRef ds:uri="http://schemas.microsoft.com/office/2006/metadata/contentType"/>
@@ -9402,12 +9522,4 @@
     <ds:schemaRef ds:uri="http://schemas.microsoft.com/internal/obd"/>
   </ds:schemaRefs>
 </ds:datastoreItem>
-</file>
-
-<file path=customXml/itemProps2.xml><?xml version="1.0" encoding="utf-8"?>
-<ds:datastoreItem xmlns:ds="http://schemas.openxmlformats.org/officeDocument/2006/customXml" ds:itemID="{87D72E06-1029-4F4F-A291-72DB24A2B963}">
-  <ds:schemaRefs>
-    <ds:schemaRef ds:uri="http://schemas.microsoft.com/sharepoint/v3/contenttype/forms"/>
-  </ds:schemaRefs>
-</ds:datastoreItem>
 </file>
</xml_diff>